<commit_message>
Updated presentation and Coding examples
</commit_message>
<xml_diff>
--- a/Coding_Concepts.pptx
+++ b/Coding_Concepts.pptx
@@ -15,6 +15,11 @@
     <p:sldId id="260" r:id="rId12"/>
     <p:sldId id="261" r:id="rId13"/>
     <p:sldId id="262" r:id="rId14"/>
+    <p:sldId id="263" r:id="rId15"/>
+    <p:sldId id="264" r:id="rId16"/>
+    <p:sldId id="265" r:id="rId17"/>
+    <p:sldId id="266" r:id="rId18"/>
+    <p:sldId id="267" r:id="rId19"/>
   </p:sldIdLst>
   <p:sldSz cx="13004800" cy="9753600"/>
   <p:notesSz cx="6858000" cy="9144000"/>
@@ -2989,6 +2994,402 @@
 </p:sld>
 </file>
 
+<file path=ppt/slides/slide10.xml><?xml version="1.0" encoding="utf-8"?>
+<p:sld xmlns:a="http://schemas.openxmlformats.org/drawingml/2006/main" xmlns:r="http://schemas.openxmlformats.org/officeDocument/2006/relationships" xmlns:p="http://schemas.openxmlformats.org/presentationml/2006/main" xmlns:m="http://schemas.openxmlformats.org/officeDocument/2006/math" xmlns:a14="http://schemas.microsoft.com/office/drawing/2010/main" showMasterSp="1" showMasterPhAnim="1">
+  <p:cSld>
+    <p:spTree>
+      <p:nvGrpSpPr>
+        <p:cNvPr id="1" name=""/>
+        <p:cNvGrpSpPr/>
+        <p:nvPr/>
+      </p:nvGrpSpPr>
+      <p:grpSpPr>
+        <a:xfrm>
+          <a:off x="0" y="0"/>
+          <a:ext cx="0" cy="0"/>
+          <a:chOff x="0" y="0"/>
+          <a:chExt cx="0" cy="0"/>
+        </a:xfrm>
+      </p:grpSpPr>
+      <p:sp>
+        <p:nvSpPr>
+          <p:cNvPr id="155" name="PYTHON - FUNCTIONS"/>
+          <p:cNvSpPr txBox="1"/>
+          <p:nvPr>
+            <p:ph type="title"/>
+          </p:nvPr>
+        </p:nvSpPr>
+        <p:spPr>
+          <a:xfrm>
+            <a:off x="952500" y="406400"/>
+            <a:ext cx="11099800" cy="1377603"/>
+          </a:xfrm>
+          <a:prstGeom prst="rect">
+            <a:avLst/>
+          </a:prstGeom>
+        </p:spPr>
+        <p:txBody>
+          <a:bodyPr/>
+          <a:lstStyle>
+            <a:lvl1pPr>
+              <a:defRPr sz="5600"/>
+            </a:lvl1pPr>
+          </a:lstStyle>
+          <a:p>
+            <a:pPr/>
+            <a:r>
+              <a:t>PYTHON - FUNCTIONS</a:t>
+            </a:r>
+          </a:p>
+        </p:txBody>
+      </p:sp>
+      <p:sp>
+        <p:nvSpPr>
+          <p:cNvPr id="156" name="A function in a programming language is a program fragment that 'knows' how to perform a defined task. For example a function may be written that finds the average of three supplied numbers. Once written, this function may be used many times without having to rewrite it over and over.…"/>
+          <p:cNvSpPr txBox="1"/>
+          <p:nvPr>
+            <p:ph type="body" idx="1"/>
+          </p:nvPr>
+        </p:nvSpPr>
+        <p:spPr>
+          <a:xfrm>
+            <a:off x="952500" y="1761529"/>
+            <a:ext cx="11099800" cy="7115771"/>
+          </a:xfrm>
+          <a:prstGeom prst="rect">
+            <a:avLst/>
+          </a:prstGeom>
+        </p:spPr>
+        <p:txBody>
+          <a:bodyPr/>
+          <a:lstStyle/>
+          <a:p>
+            <a:pPr lvl="1" marL="0" indent="0" defTabSz="484886">
+              <a:spcBef>
+                <a:spcPts val="800"/>
+              </a:spcBef>
+              <a:buSzTx/>
+              <a:buNone/>
+              <a:defRPr sz="3154"/>
+            </a:pPr>
+            <a:r>
+              <a:t>A </a:t>
+            </a:r>
+            <a:r>
+              <a:rPr b="1">
+                <a:latin typeface="Helvetica"/>
+                <a:ea typeface="Helvetica"/>
+                <a:cs typeface="Helvetica"/>
+                <a:sym typeface="Helvetica"/>
+              </a:rPr>
+              <a:t>function</a:t>
+            </a:r>
+            <a:r>
+              <a:t> in a programming language is a program fragment that 'knows' how to perform a defined task. For example a function may be written that finds the average of three supplied numbers. Once written, this function may be used many times without having to rewrite it over and over.</a:t>
+            </a:r>
+          </a:p>
+          <a:p>
+            <a:pPr marL="379475" indent="-379475" defTabSz="484886">
+              <a:spcBef>
+                <a:spcPts val="3400"/>
+              </a:spcBef>
+              <a:defRPr sz="3154"/>
+            </a:pPr>
+            <a:r>
+              <a:t>Functions</a:t>
+            </a:r>
+          </a:p>
+          <a:p>
+            <a:pPr lvl="1" marL="758951" indent="-379475" defTabSz="484886">
+              <a:spcBef>
+                <a:spcPts val="3400"/>
+              </a:spcBef>
+              <a:defRPr sz="3154"/>
+            </a:pPr>
+            <a:r>
+              <a:t>functions</a:t>
+            </a:r>
+          </a:p>
+          <a:p>
+            <a:pPr lvl="2" marL="1138427" indent="-379475" defTabSz="484886">
+              <a:spcBef>
+                <a:spcPts val="3400"/>
+              </a:spcBef>
+              <a:defRPr sz="3154"/>
+            </a:pPr>
+            <a:r>
+              <a:t>e.g. range()</a:t>
+            </a:r>
+          </a:p>
+          <a:p>
+            <a:pPr lvl="1" marL="758951" indent="-379475" defTabSz="484886">
+              <a:spcBef>
+                <a:spcPts val="3400"/>
+              </a:spcBef>
+              <a:defRPr sz="3154"/>
+            </a:pPr>
+            <a:r>
+              <a:t>lambda expressions</a:t>
+            </a:r>
+          </a:p>
+          <a:p>
+            <a:pPr lvl="2" marL="1138427" indent="-379475" defTabSz="484886">
+              <a:spcBef>
+                <a:spcPts val="3400"/>
+              </a:spcBef>
+              <a:defRPr sz="3154"/>
+            </a:pPr>
+            <a:r>
+              <a:t>e.g. map() and filter()</a:t>
+            </a:r>
+          </a:p>
+        </p:txBody>
+      </p:sp>
+    </p:spTree>
+  </p:cSld>
+  <p:clrMapOvr>
+    <a:masterClrMapping/>
+  </p:clrMapOvr>
+  <mc:AlternateContent xmlns:mc="http://schemas.openxmlformats.org/markup-compatibility/2006">
+    <mc:Choice xmlns:p14="http://schemas.microsoft.com/office/powerpoint/2010/main" Requires="p14">
+      <p:transition spd="slow" advClick="1" p14:dur="1500">
+        <p:cover dir="l"/>
+      </p:transition>
+    </mc:Choice>
+    <mc:Fallback>
+      <p:transition spd="slow">
+        <p:fade/>
+      </p:transition>
+    </mc:Fallback>
+  </mc:AlternateContent>
+</p:sld>
+</file>
+
+<file path=ppt/slides/slide11.xml><?xml version="1.0" encoding="utf-8"?>
+<p:sld xmlns:a="http://schemas.openxmlformats.org/drawingml/2006/main" xmlns:r="http://schemas.openxmlformats.org/officeDocument/2006/relationships" xmlns:p="http://schemas.openxmlformats.org/presentationml/2006/main" xmlns:m="http://schemas.openxmlformats.org/officeDocument/2006/math" xmlns:a14="http://schemas.microsoft.com/office/drawing/2010/main" showMasterSp="1" showMasterPhAnim="1">
+  <p:cSld>
+    <p:spTree>
+      <p:nvGrpSpPr>
+        <p:cNvPr id="1" name=""/>
+        <p:cNvGrpSpPr/>
+        <p:nvPr/>
+      </p:nvGrpSpPr>
+      <p:grpSpPr>
+        <a:xfrm>
+          <a:off x="0" y="0"/>
+          <a:ext cx="0" cy="0"/>
+          <a:chOff x="0" y="0"/>
+          <a:chExt cx="0" cy="0"/>
+        </a:xfrm>
+      </p:grpSpPr>
+      <p:sp>
+        <p:nvSpPr>
+          <p:cNvPr id="158" name="Classes, Objects, Methods"/>
+          <p:cNvSpPr txBox="1"/>
+          <p:nvPr>
+            <p:ph type="title"/>
+          </p:nvPr>
+        </p:nvSpPr>
+        <p:spPr>
+          <a:xfrm>
+            <a:off x="952500" y="406400"/>
+            <a:ext cx="11099800" cy="1437134"/>
+          </a:xfrm>
+          <a:prstGeom prst="rect">
+            <a:avLst/>
+          </a:prstGeom>
+        </p:spPr>
+        <p:txBody>
+          <a:bodyPr/>
+          <a:lstStyle>
+            <a:lvl1pPr defTabSz="519937">
+              <a:defRPr sz="7119"/>
+            </a:lvl1pPr>
+          </a:lstStyle>
+          <a:p>
+            <a:pPr/>
+            <a:r>
+              <a:t>Classes, Objects, Methods</a:t>
+            </a:r>
+          </a:p>
+        </p:txBody>
+      </p:sp>
+      <p:sp>
+        <p:nvSpPr>
+          <p:cNvPr id="159" name="In Object-Oriented language, Classes provide a means of bundling data (to maintain the state) and functionality (methods) together.…"/>
+          <p:cNvSpPr txBox="1"/>
+          <p:nvPr>
+            <p:ph type="body" idx="1"/>
+          </p:nvPr>
+        </p:nvSpPr>
+        <p:spPr>
+          <a:xfrm>
+            <a:off x="952500" y="1955353"/>
+            <a:ext cx="11099800" cy="5461348"/>
+          </a:xfrm>
+          <a:prstGeom prst="rect">
+            <a:avLst/>
+          </a:prstGeom>
+        </p:spPr>
+        <p:txBody>
+          <a:bodyPr/>
+          <a:lstStyle/>
+          <a:p>
+            <a:pPr lvl="1">
+              <a:spcBef>
+                <a:spcPts val="1000"/>
+              </a:spcBef>
+            </a:pPr>
+            <a:r>
+              <a:t>In Object-Oriented language, </a:t>
+            </a:r>
+            <a:r>
+              <a:rPr b="1">
+                <a:latin typeface="Helvetica"/>
+                <a:ea typeface="Helvetica"/>
+                <a:cs typeface="Helvetica"/>
+                <a:sym typeface="Helvetica"/>
+              </a:rPr>
+              <a:t>Classes</a:t>
+            </a:r>
+            <a:r>
+              <a:t> provide a means of bundling data (to maintain the state) and functionality (methods) together. </a:t>
+            </a:r>
+          </a:p>
+          <a:p>
+            <a:pPr lvl="1">
+              <a:spcBef>
+                <a:spcPts val="1000"/>
+              </a:spcBef>
+            </a:pPr>
+            <a:r>
+              <a:t>A Class is like an object constructor, or a “template / blueprint” for creating objects.</a:t>
+            </a:r>
+          </a:p>
+          <a:p>
+            <a:pPr lvl="1">
+              <a:spcBef>
+                <a:spcPts val="1000"/>
+              </a:spcBef>
+            </a:pPr>
+            <a:r>
+              <a:t>Instances of the Class are called Objects.</a:t>
+            </a:r>
+          </a:p>
+          <a:p>
+            <a:pPr lvl="1">
+              <a:spcBef>
+                <a:spcPts val="1000"/>
+              </a:spcBef>
+            </a:pPr>
+            <a:r>
+              <a:rPr b="1">
+                <a:latin typeface="Helvetica"/>
+                <a:ea typeface="Helvetica"/>
+                <a:cs typeface="Helvetica"/>
+                <a:sym typeface="Helvetica"/>
+              </a:rPr>
+              <a:t>Python</a:t>
+            </a:r>
+            <a:r>
+              <a:t> is an </a:t>
+            </a:r>
+            <a:r>
+              <a:rPr b="1">
+                <a:latin typeface="Helvetica"/>
+                <a:ea typeface="Helvetica"/>
+                <a:cs typeface="Helvetica"/>
+                <a:sym typeface="Helvetica"/>
+              </a:rPr>
+              <a:t>Object-Oriented programming language</a:t>
+            </a:r>
+            <a:r>
+              <a:t>.</a:t>
+            </a:r>
+          </a:p>
+        </p:txBody>
+      </p:sp>
+    </p:spTree>
+  </p:cSld>
+  <p:clrMapOvr>
+    <a:masterClrMapping/>
+  </p:clrMapOvr>
+  <mc:AlternateContent xmlns:mc="http://schemas.openxmlformats.org/markup-compatibility/2006">
+    <mc:Choice xmlns:p14="http://schemas.microsoft.com/office/powerpoint/2010/main" Requires="p14">
+      <p:transition spd="slow" advClick="1" p14:dur="1500">
+        <p:cover dir="l"/>
+      </p:transition>
+    </mc:Choice>
+    <mc:Fallback>
+      <p:transition spd="slow">
+        <p:fade/>
+      </p:transition>
+    </mc:Fallback>
+  </mc:AlternateContent>
+</p:sld>
+</file>
+
+<file path=ppt/slides/slide12.xml><?xml version="1.0" encoding="utf-8"?>
+<p:sld xmlns:a="http://schemas.openxmlformats.org/drawingml/2006/main" xmlns:r="http://schemas.openxmlformats.org/officeDocument/2006/relationships" xmlns:p="http://schemas.openxmlformats.org/presentationml/2006/main" xmlns:m="http://schemas.openxmlformats.org/officeDocument/2006/math" xmlns:a14="http://schemas.microsoft.com/office/drawing/2010/main" showMasterSp="1" showMasterPhAnim="1">
+  <p:cSld>
+    <p:spTree>
+      <p:nvGrpSpPr>
+        <p:cNvPr id="1" name=""/>
+        <p:cNvGrpSpPr/>
+        <p:nvPr/>
+      </p:nvGrpSpPr>
+      <p:grpSpPr>
+        <a:xfrm>
+          <a:off x="0" y="0"/>
+          <a:ext cx="0" cy="0"/>
+          <a:chOff x="0" y="0"/>
+          <a:chExt cx="0" cy="0"/>
+        </a:xfrm>
+      </p:grpSpPr>
+      <p:sp>
+        <p:nvSpPr>
+          <p:cNvPr id="161" name="PYTHON OVERVIEW"/>
+          <p:cNvSpPr txBox="1"/>
+          <p:nvPr>
+            <p:ph type="title"/>
+          </p:nvPr>
+        </p:nvSpPr>
+        <p:spPr>
+          <a:prstGeom prst="rect">
+            <a:avLst/>
+          </a:prstGeom>
+        </p:spPr>
+        <p:txBody>
+          <a:bodyPr/>
+          <a:lstStyle/>
+          <a:p>
+            <a:pPr/>
+            <a:r>
+              <a:t>PYTHON OVERVIEW</a:t>
+            </a:r>
+          </a:p>
+        </p:txBody>
+      </p:sp>
+    </p:spTree>
+  </p:cSld>
+  <p:clrMapOvr>
+    <a:masterClrMapping/>
+  </p:clrMapOvr>
+  <mc:AlternateContent xmlns:mc="http://schemas.openxmlformats.org/markup-compatibility/2006">
+    <mc:Choice xmlns:p14="http://schemas.microsoft.com/office/powerpoint/2010/main" Requires="p14">
+      <p:transition spd="slow" advClick="1" p14:dur="1500">
+        <p:cover dir="l"/>
+      </p:transition>
+    </mc:Choice>
+    <mc:Fallback>
+      <p:transition spd="slow">
+        <p:fade/>
+      </p:transition>
+    </mc:Fallback>
+  </mc:AlternateContent>
+</p:sld>
+</file>
+
 <file path=ppt/slides/slide2.xml><?xml version="1.0" encoding="utf-8"?>
 <p:sld xmlns:a="http://schemas.openxmlformats.org/drawingml/2006/main" xmlns:r="http://schemas.openxmlformats.org/officeDocument/2006/relationships" xmlns:p="http://schemas.openxmlformats.org/presentationml/2006/main" xmlns:m="http://schemas.openxmlformats.org/officeDocument/2006/math" xmlns:a14="http://schemas.microsoft.com/office/drawing/2010/main" showMasterSp="1" showMasterPhAnim="1">
   <p:cSld>
@@ -3103,7 +3504,7 @@
   </p:clrMapOvr>
   <mc:AlternateContent xmlns:mc="http://schemas.openxmlformats.org/markup-compatibility/2006">
     <mc:Choice xmlns:p14="http://schemas.microsoft.com/office/powerpoint/2010/main" Requires="p14">
-      <p:transition spd="slow" advClick="0" advTm="0" p14:dur="1500">
+      <p:transition spd="slow" advClick="1" p14:dur="1500">
         <p:push dir="l"/>
       </p:transition>
     </mc:Choice>
@@ -4933,13 +5334,13 @@
           <p:cNvPr id="144" name="Basic parts of any Programming Language are -…"/>
           <p:cNvSpPr txBox="1"/>
           <p:nvPr>
-            <p:ph type="body" idx="1"/>
+            <p:ph type="body" sz="half" idx="1"/>
           </p:nvPr>
         </p:nvSpPr>
         <p:spPr>
           <a:xfrm>
             <a:off x="952500" y="2590800"/>
-            <a:ext cx="11099800" cy="6195070"/>
+            <a:ext cx="11099800" cy="4431110"/>
           </a:xfrm>
           <a:prstGeom prst="rect">
             <a:avLst/>
@@ -4949,22 +5350,16 @@
           <a:bodyPr/>
           <a:lstStyle/>
           <a:p>
-            <a:pPr marL="320039" indent="-320039" defTabSz="408940">
+            <a:pPr/>
+            <a:r>
+              <a:t>Basic parts of any Programming Language are - </a:t>
+            </a:r>
+          </a:p>
+          <a:p>
+            <a:pPr lvl="1">
               <a:spcBef>
-                <a:spcPts val="2900"/>
+                <a:spcPts val="1000"/>
               </a:spcBef>
-              <a:defRPr sz="2660"/>
-            </a:pPr>
-            <a:r>
-              <a:t>Basic parts of any Programming Language are - </a:t>
-            </a:r>
-          </a:p>
-          <a:p>
-            <a:pPr lvl="1" marL="640079" indent="-320039" defTabSz="408940">
-              <a:spcBef>
-                <a:spcPts val="700"/>
-              </a:spcBef>
-              <a:defRPr sz="2660"/>
             </a:pPr>
             <a:r>
               <a:rPr b="1">
@@ -4975,16 +5370,18 @@
               </a:rPr>
               <a:t>Data Types</a:t>
             </a:r>
-            <a:r>
-              <a:t> to store data</a:t>
-            </a:r>
-          </a:p>
-          <a:p>
-            <a:pPr lvl="1" marL="640079" indent="-320039" defTabSz="408940">
+            <a:endParaRPr b="1">
+              <a:latin typeface="Helvetica"/>
+              <a:ea typeface="Helvetica"/>
+              <a:cs typeface="Helvetica"/>
+              <a:sym typeface="Helvetica"/>
+            </a:endParaRPr>
+          </a:p>
+          <a:p>
+            <a:pPr lvl="1">
               <a:spcBef>
-                <a:spcPts val="700"/>
+                <a:spcPts val="1000"/>
               </a:spcBef>
-              <a:defRPr sz="2660"/>
             </a:pPr>
             <a:r>
               <a:rPr b="1">
@@ -4995,16 +5392,18 @@
               </a:rPr>
               <a:t>Operators</a:t>
             </a:r>
-            <a:r>
-              <a:t> to perform operations on the data</a:t>
-            </a:r>
-          </a:p>
-          <a:p>
-            <a:pPr lvl="1" marL="640079" indent="-320039" defTabSz="408940">
+            <a:endParaRPr b="1">
+              <a:latin typeface="Helvetica"/>
+              <a:ea typeface="Helvetica"/>
+              <a:cs typeface="Helvetica"/>
+              <a:sym typeface="Helvetica"/>
+            </a:endParaRPr>
+          </a:p>
+          <a:p>
+            <a:pPr lvl="1">
               <a:spcBef>
-                <a:spcPts val="700"/>
+                <a:spcPts val="1000"/>
               </a:spcBef>
-              <a:defRPr sz="2660"/>
             </a:pPr>
             <a:r>
               <a:rPr b="1">
@@ -5015,65 +5414,6 @@
               </a:rPr>
               <a:t>Statements</a:t>
             </a:r>
-            <a:r>
-              <a:t> to perform an action to process the data</a:t>
-            </a:r>
-          </a:p>
-          <a:p>
-            <a:pPr lvl="1" marL="640079" indent="-320039" defTabSz="408940">
-              <a:spcBef>
-                <a:spcPts val="700"/>
-              </a:spcBef>
-              <a:defRPr sz="2660"/>
-            </a:pPr>
-            <a:r>
-              <a:rPr b="1">
-                <a:latin typeface="Helvetica"/>
-                <a:ea typeface="Helvetica"/>
-                <a:cs typeface="Helvetica"/>
-                <a:sym typeface="Helvetica"/>
-              </a:rPr>
-              <a:t>Class and methods </a:t>
-            </a:r>
-            <a:r>
-              <a:t>- In </a:t>
-            </a:r>
-            <a:r>
-              <a:rPr b="1">
-                <a:latin typeface="Helvetica"/>
-                <a:ea typeface="Helvetica"/>
-                <a:cs typeface="Helvetica"/>
-                <a:sym typeface="Helvetica"/>
-              </a:rPr>
-              <a:t>object-oriented</a:t>
-            </a:r>
-            <a:r>
-              <a:t> programming (</a:t>
-            </a:r>
-            <a:r>
-              <a:rPr b="1">
-                <a:latin typeface="Helvetica"/>
-                <a:ea typeface="Helvetica"/>
-                <a:cs typeface="Helvetica"/>
-                <a:sym typeface="Helvetica"/>
-              </a:rPr>
-              <a:t>Python</a:t>
-            </a:r>
-            <a:r>
-              <a:t> </a:t>
-            </a:r>
-            <a:r>
-              <a:rPr b="1">
-                <a:latin typeface="Helvetica"/>
-                <a:ea typeface="Helvetica"/>
-                <a:cs typeface="Helvetica"/>
-                <a:sym typeface="Helvetica"/>
-              </a:rPr>
-              <a:t>is Object-Oriented Language</a:t>
-            </a:r>
-            <a:r>
-              <a:t>), a class is an extensible program-code-template / blueprint for creating objects (a.k.a instances of class), providing initial values for state (member variables) and implementations of behavior (member functions or methods)</a:t>
-            </a:r>
             <a:endParaRPr b="1">
               <a:latin typeface="Helvetica"/>
               <a:ea typeface="Helvetica"/>
@@ -5082,11 +5422,10 @@
             </a:endParaRPr>
           </a:p>
           <a:p>
-            <a:pPr lvl="1" marL="640079" indent="-320039" defTabSz="408940">
+            <a:pPr lvl="1">
               <a:spcBef>
-                <a:spcPts val="700"/>
+                <a:spcPts val="1000"/>
               </a:spcBef>
-              <a:defRPr sz="2660"/>
             </a:pPr>
             <a:r>
               <a:rPr b="1">
@@ -5097,8 +5436,27 @@
               </a:rPr>
               <a:t>Functions</a:t>
             </a:r>
-            <a:r>
-              <a:t> - A function in a programming language is a program fragment that 'knows' how to perform a defined task. For example a function may be written that finds the average of three supplied numbers. Once written, this function may be used many times without having to rewrite it over and over.</a:t>
+            <a:endParaRPr b="1">
+              <a:latin typeface="Helvetica"/>
+              <a:ea typeface="Helvetica"/>
+              <a:cs typeface="Helvetica"/>
+              <a:sym typeface="Helvetica"/>
+            </a:endParaRPr>
+          </a:p>
+          <a:p>
+            <a:pPr lvl="1">
+              <a:spcBef>
+                <a:spcPts val="1000"/>
+              </a:spcBef>
+            </a:pPr>
+            <a:r>
+              <a:rPr b="1">
+                <a:latin typeface="Helvetica"/>
+                <a:ea typeface="Helvetica"/>
+                <a:cs typeface="Helvetica"/>
+                <a:sym typeface="Helvetica"/>
+              </a:rPr>
+              <a:t>Class, Objects and Methods</a:t>
             </a:r>
           </a:p>
         </p:txBody>
@@ -5142,13 +5500,49 @@
       </p:grpSpPr>
       <p:sp>
         <p:nvSpPr>
-          <p:cNvPr id="146" name="PYTHON OVERVIEW"/>
+          <p:cNvPr id="146" name="PYTHON - DATA TYPES"/>
           <p:cNvSpPr txBox="1"/>
           <p:nvPr>
             <p:ph type="title"/>
           </p:nvPr>
         </p:nvSpPr>
         <p:spPr>
+          <a:xfrm>
+            <a:off x="952500" y="406400"/>
+            <a:ext cx="11099801" cy="713086"/>
+          </a:xfrm>
+          <a:prstGeom prst="rect">
+            <a:avLst/>
+          </a:prstGeom>
+        </p:spPr>
+        <p:txBody>
+          <a:bodyPr/>
+          <a:lstStyle>
+            <a:lvl1pPr defTabSz="426466">
+              <a:defRPr sz="4088"/>
+            </a:lvl1pPr>
+          </a:lstStyle>
+          <a:p>
+            <a:pPr/>
+            <a:r>
+              <a:t>PYTHON - DATA TYPES</a:t>
+            </a:r>
+          </a:p>
+        </p:txBody>
+      </p:sp>
+      <p:sp>
+        <p:nvSpPr>
+          <p:cNvPr id="147" name="Data Types to store data…"/>
+          <p:cNvSpPr txBox="1"/>
+          <p:nvPr>
+            <p:ph type="body" idx="1"/>
+          </p:nvPr>
+        </p:nvSpPr>
+        <p:spPr>
+          <a:xfrm>
+            <a:off x="952500" y="1067742"/>
+            <a:ext cx="11099800" cy="8275936"/>
+          </a:xfrm>
           <a:prstGeom prst="rect">
             <a:avLst/>
           </a:prstGeom>
@@ -5157,9 +5551,610 @@
           <a:bodyPr/>
           <a:lstStyle/>
           <a:p>
+            <a:pPr lvl="1" marL="0" indent="0" defTabSz="251206">
+              <a:spcBef>
+                <a:spcPts val="400"/>
+              </a:spcBef>
+              <a:buSzTx/>
+              <a:buNone/>
+              <a:defRPr sz="2580"/>
+            </a:pPr>
+            <a:r>
+              <a:rPr b="1">
+                <a:latin typeface="Helvetica"/>
+                <a:ea typeface="Helvetica"/>
+                <a:cs typeface="Helvetica"/>
+                <a:sym typeface="Helvetica"/>
+              </a:rPr>
+              <a:t>Data Types</a:t>
+            </a:r>
+            <a:r>
+              <a:t> to store data</a:t>
+            </a:r>
+          </a:p>
+          <a:p>
+            <a:pPr marL="196596" indent="-196596" defTabSz="251206">
+              <a:spcBef>
+                <a:spcPts val="1800"/>
+              </a:spcBef>
+              <a:buSzPct val="108000"/>
+              <a:defRPr b="1" sz="1634">
+                <a:latin typeface="Helvetica"/>
+                <a:ea typeface="Helvetica"/>
+                <a:cs typeface="Helvetica"/>
+                <a:sym typeface="Helvetica"/>
+              </a:defRPr>
+            </a:pPr>
+            <a:r>
+              <a:t>Data Types </a:t>
+            </a:r>
+          </a:p>
+          <a:p>
+            <a:pPr lvl="1" marL="393192" indent="-196596" defTabSz="251206">
+              <a:spcBef>
+                <a:spcPts val="1800"/>
+              </a:spcBef>
+              <a:buSzPct val="100000"/>
+              <a:defRPr b="1" sz="1634">
+                <a:latin typeface="Helvetica"/>
+                <a:ea typeface="Helvetica"/>
+                <a:cs typeface="Helvetica"/>
+                <a:sym typeface="Helvetica"/>
+              </a:defRPr>
+            </a:pPr>
+            <a:r>
+              <a:t>Primitive Data Types</a:t>
+            </a:r>
+          </a:p>
+          <a:p>
+            <a:pPr lvl="2" marL="589788" indent="-196596" defTabSz="251206">
+              <a:spcBef>
+                <a:spcPts val="1800"/>
+              </a:spcBef>
+              <a:defRPr sz="1634"/>
+            </a:pPr>
+            <a:r>
+              <a:t>None - None</a:t>
+            </a:r>
+          </a:p>
+          <a:p>
+            <a:pPr lvl="2" marL="589788" indent="-196596" defTabSz="251206">
+              <a:spcBef>
+                <a:spcPts val="1800"/>
+              </a:spcBef>
+              <a:defRPr sz="1634"/>
+            </a:pPr>
+            <a:r>
+              <a:t>Integer Numbers - int</a:t>
+            </a:r>
+          </a:p>
+          <a:p>
+            <a:pPr lvl="2" marL="589788" indent="-196596" defTabSz="251206">
+              <a:spcBef>
+                <a:spcPts val="1800"/>
+              </a:spcBef>
+              <a:defRPr sz="1634"/>
+            </a:pPr>
+            <a:r>
+              <a:t>Floating Point Numbers - float</a:t>
+            </a:r>
+          </a:p>
+          <a:p>
+            <a:pPr lvl="2" marL="589788" indent="-196596" defTabSz="251206">
+              <a:spcBef>
+                <a:spcPts val="1800"/>
+              </a:spcBef>
+              <a:defRPr sz="1634"/>
+            </a:pPr>
+            <a:r>
+              <a:t>Strings - str</a:t>
+            </a:r>
+          </a:p>
+          <a:p>
+            <a:pPr lvl="2" marL="589788" indent="-196596" defTabSz="251206">
+              <a:spcBef>
+                <a:spcPts val="1800"/>
+              </a:spcBef>
+              <a:defRPr sz="1634"/>
+            </a:pPr>
+            <a:r>
+              <a:t>Booleans - bool</a:t>
+            </a:r>
+          </a:p>
+          <a:p>
+            <a:pPr lvl="2" marL="589788" indent="-196596" defTabSz="251206">
+              <a:spcBef>
+                <a:spcPts val="1800"/>
+              </a:spcBef>
+              <a:defRPr sz="1634"/>
+            </a:pPr>
+            <a:r>
+              <a:t>(Type Conversion)</a:t>
+            </a:r>
+          </a:p>
+          <a:p>
+            <a:pPr lvl="2" marL="589788" indent="-196596" defTabSz="251206">
+              <a:spcBef>
+                <a:spcPts val="1800"/>
+              </a:spcBef>
+              <a:defRPr sz="1634"/>
+            </a:pPr>
+            <a:r>
+              <a:t>(Variable Assignment)</a:t>
+            </a:r>
+          </a:p>
+          <a:p>
+            <a:pPr lvl="2" marL="589788" indent="-196596" defTabSz="251206">
+              <a:spcBef>
+                <a:spcPts val="1800"/>
+              </a:spcBef>
+              <a:defRPr sz="1634"/>
+            </a:pPr>
+            <a:r>
+              <a:t>(Printing)</a:t>
+            </a:r>
+          </a:p>
+          <a:p>
+            <a:pPr lvl="1" marL="393192" indent="-196596" defTabSz="251206">
+              <a:spcBef>
+                <a:spcPts val="1800"/>
+              </a:spcBef>
+              <a:buSzPct val="100000"/>
+              <a:defRPr b="1" sz="1634">
+                <a:latin typeface="Helvetica"/>
+                <a:ea typeface="Helvetica"/>
+                <a:cs typeface="Helvetica"/>
+                <a:sym typeface="Helvetica"/>
+              </a:defRPr>
+            </a:pPr>
+            <a:r>
+              <a:t>Collection Data Types</a:t>
+            </a:r>
+          </a:p>
+          <a:p>
+            <a:pPr lvl="2" marL="589788" indent="-196596" defTabSz="251206">
+              <a:spcBef>
+                <a:spcPts val="1800"/>
+              </a:spcBef>
+              <a:defRPr sz="1634"/>
+            </a:pPr>
+            <a:r>
+              <a:t>Lists - list</a:t>
+            </a:r>
+          </a:p>
+          <a:p>
+            <a:pPr lvl="2" marL="589788" indent="-196596" defTabSz="251206">
+              <a:spcBef>
+                <a:spcPts val="1800"/>
+              </a:spcBef>
+              <a:defRPr sz="1634"/>
+            </a:pPr>
+            <a:r>
+              <a:t>Sets - set</a:t>
+            </a:r>
+          </a:p>
+          <a:p>
+            <a:pPr lvl="2" marL="589788" indent="-196596" defTabSz="251206">
+              <a:spcBef>
+                <a:spcPts val="1800"/>
+              </a:spcBef>
+              <a:defRPr sz="1634"/>
+            </a:pPr>
+            <a:r>
+              <a:t>Tuples - tuple</a:t>
+            </a:r>
+          </a:p>
+          <a:p>
+            <a:pPr lvl="2" marL="589788" indent="-196596" defTabSz="251206">
+              <a:spcBef>
+                <a:spcPts val="1800"/>
+              </a:spcBef>
+              <a:defRPr sz="1634"/>
+            </a:pPr>
+            <a:r>
+              <a:t>Tuple Unpacking</a:t>
+            </a:r>
+          </a:p>
+          <a:p>
+            <a:pPr lvl="2" marL="589788" indent="-196596" defTabSz="251206">
+              <a:spcBef>
+                <a:spcPts val="1800"/>
+              </a:spcBef>
+              <a:defRPr sz="1634"/>
+            </a:pPr>
+            <a:r>
+              <a:t>Dictionaries - dict</a:t>
+            </a:r>
+          </a:p>
+        </p:txBody>
+      </p:sp>
+    </p:spTree>
+  </p:cSld>
+  <p:clrMapOvr>
+    <a:masterClrMapping/>
+  </p:clrMapOvr>
+  <mc:AlternateContent xmlns:mc="http://schemas.openxmlformats.org/markup-compatibility/2006">
+    <mc:Choice xmlns:p14="http://schemas.microsoft.com/office/powerpoint/2010/main" Requires="p14">
+      <p:transition spd="slow" advClick="1" p14:dur="1500">
+        <p:cover dir="l"/>
+      </p:transition>
+    </mc:Choice>
+    <mc:Fallback>
+      <p:transition spd="slow">
+        <p:fade/>
+      </p:transition>
+    </mc:Fallback>
+  </mc:AlternateContent>
+</p:sld>
+</file>
+
+<file path=ppt/slides/slide8.xml><?xml version="1.0" encoding="utf-8"?>
+<p:sld xmlns:a="http://schemas.openxmlformats.org/drawingml/2006/main" xmlns:r="http://schemas.openxmlformats.org/officeDocument/2006/relationships" xmlns:p="http://schemas.openxmlformats.org/presentationml/2006/main" xmlns:m="http://schemas.openxmlformats.org/officeDocument/2006/math" xmlns:a14="http://schemas.microsoft.com/office/drawing/2010/main" showMasterSp="1" showMasterPhAnim="1">
+  <p:cSld>
+    <p:spTree>
+      <p:nvGrpSpPr>
+        <p:cNvPr id="1" name=""/>
+        <p:cNvGrpSpPr/>
+        <p:nvPr/>
+      </p:nvGrpSpPr>
+      <p:grpSpPr>
+        <a:xfrm>
+          <a:off x="0" y="0"/>
+          <a:ext cx="0" cy="0"/>
+          <a:chOff x="0" y="0"/>
+          <a:chExt cx="0" cy="0"/>
+        </a:xfrm>
+      </p:grpSpPr>
+      <p:sp>
+        <p:nvSpPr>
+          <p:cNvPr id="149" name="PYTHON - OPERATORS"/>
+          <p:cNvSpPr txBox="1"/>
+          <p:nvPr>
+            <p:ph type="title"/>
+          </p:nvPr>
+        </p:nvSpPr>
+        <p:spPr>
+          <a:xfrm>
+            <a:off x="952500" y="406400"/>
+            <a:ext cx="11099800" cy="1266032"/>
+          </a:xfrm>
+          <a:prstGeom prst="rect">
+            <a:avLst/>
+          </a:prstGeom>
+        </p:spPr>
+        <p:txBody>
+          <a:bodyPr/>
+          <a:lstStyle>
+            <a:lvl1pPr>
+              <a:defRPr sz="5600"/>
+            </a:lvl1pPr>
+          </a:lstStyle>
+          <a:p>
             <a:pPr/>
             <a:r>
-              <a:t>PYTHON OVERVIEW</a:t>
+              <a:t>PYTHON - OPERATORS</a:t>
+            </a:r>
+          </a:p>
+        </p:txBody>
+      </p:sp>
+      <p:sp>
+        <p:nvSpPr>
+          <p:cNvPr id="150" name="Operators are used to perform operations on the data…"/>
+          <p:cNvSpPr txBox="1"/>
+          <p:nvPr>
+            <p:ph type="body" idx="1"/>
+          </p:nvPr>
+        </p:nvSpPr>
+        <p:spPr>
+          <a:xfrm>
+            <a:off x="952500" y="1925339"/>
+            <a:ext cx="11099800" cy="6951961"/>
+          </a:xfrm>
+          <a:prstGeom prst="rect">
+            <a:avLst/>
+          </a:prstGeom>
+        </p:spPr>
+        <p:txBody>
+          <a:bodyPr/>
+          <a:lstStyle/>
+          <a:p>
+            <a:pPr lvl="1" marL="0" indent="0" defTabSz="543305">
+              <a:spcBef>
+                <a:spcPts val="900"/>
+              </a:spcBef>
+              <a:buSzTx/>
+              <a:buNone/>
+              <a:defRPr sz="3534"/>
+            </a:pPr>
+            <a:r>
+              <a:rPr b="1">
+                <a:latin typeface="Helvetica"/>
+                <a:ea typeface="Helvetica"/>
+                <a:cs typeface="Helvetica"/>
+                <a:sym typeface="Helvetica"/>
+              </a:rPr>
+              <a:t>Operators</a:t>
+            </a:r>
+            <a:r>
+              <a:t> are used to perform operations on the data</a:t>
+            </a:r>
+          </a:p>
+          <a:p>
+            <a:pPr marL="425195" indent="-425195" defTabSz="543305">
+              <a:spcBef>
+                <a:spcPts val="3900"/>
+              </a:spcBef>
+              <a:defRPr sz="3534"/>
+            </a:pPr>
+            <a:r>
+              <a:t>Operators</a:t>
+            </a:r>
+          </a:p>
+          <a:p>
+            <a:pPr lvl="1" marL="850391" indent="-425195" defTabSz="543305">
+              <a:spcBef>
+                <a:spcPts val="3900"/>
+              </a:spcBef>
+              <a:defRPr sz="3534"/>
+            </a:pPr>
+            <a:r>
+              <a:t>Arithmetic operators</a:t>
+            </a:r>
+          </a:p>
+          <a:p>
+            <a:pPr lvl="1" marL="850391" indent="-425195" defTabSz="543305">
+              <a:spcBef>
+                <a:spcPts val="3900"/>
+              </a:spcBef>
+              <a:defRPr sz="3534"/>
+            </a:pPr>
+            <a:r>
+              <a:t>Assignment operators</a:t>
+            </a:r>
+          </a:p>
+          <a:p>
+            <a:pPr lvl="1" marL="850391" indent="-425195" defTabSz="543305">
+              <a:spcBef>
+                <a:spcPts val="3900"/>
+              </a:spcBef>
+              <a:defRPr sz="3534"/>
+            </a:pPr>
+            <a:r>
+              <a:t>Comparison operators</a:t>
+            </a:r>
+          </a:p>
+          <a:p>
+            <a:pPr lvl="1" marL="850391" indent="-425195" defTabSz="543305">
+              <a:spcBef>
+                <a:spcPts val="3900"/>
+              </a:spcBef>
+              <a:defRPr sz="3534"/>
+            </a:pPr>
+            <a:r>
+              <a:t>Logical operators</a:t>
+            </a:r>
+          </a:p>
+          <a:p>
+            <a:pPr lvl="1" marL="850391" indent="-425195" defTabSz="543305">
+              <a:spcBef>
+                <a:spcPts val="3900"/>
+              </a:spcBef>
+              <a:defRPr sz="3534"/>
+            </a:pPr>
+            <a:r>
+              <a:t>Membership Operator</a:t>
+            </a:r>
+          </a:p>
+        </p:txBody>
+      </p:sp>
+    </p:spTree>
+  </p:cSld>
+  <p:clrMapOvr>
+    <a:masterClrMapping/>
+  </p:clrMapOvr>
+  <mc:AlternateContent xmlns:mc="http://schemas.openxmlformats.org/markup-compatibility/2006">
+    <mc:Choice xmlns:p14="http://schemas.microsoft.com/office/powerpoint/2010/main" Requires="p14">
+      <p:transition spd="slow" advClick="1" p14:dur="1500">
+        <p:cover dir="l"/>
+      </p:transition>
+    </mc:Choice>
+    <mc:Fallback>
+      <p:transition spd="slow">
+        <p:fade/>
+      </p:transition>
+    </mc:Fallback>
+  </mc:AlternateContent>
+</p:sld>
+</file>
+
+<file path=ppt/slides/slide9.xml><?xml version="1.0" encoding="utf-8"?>
+<p:sld xmlns:a="http://schemas.openxmlformats.org/drawingml/2006/main" xmlns:r="http://schemas.openxmlformats.org/officeDocument/2006/relationships" xmlns:p="http://schemas.openxmlformats.org/presentationml/2006/main" xmlns:m="http://schemas.openxmlformats.org/officeDocument/2006/math" xmlns:a14="http://schemas.microsoft.com/office/drawing/2010/main" showMasterSp="1" showMasterPhAnim="1">
+  <p:cSld>
+    <p:spTree>
+      <p:nvGrpSpPr>
+        <p:cNvPr id="1" name=""/>
+        <p:cNvGrpSpPr/>
+        <p:nvPr/>
+      </p:nvGrpSpPr>
+      <p:grpSpPr>
+        <a:xfrm>
+          <a:off x="0" y="0"/>
+          <a:ext cx="0" cy="0"/>
+          <a:chOff x="0" y="0"/>
+          <a:chExt cx="0" cy="0"/>
+        </a:xfrm>
+      </p:grpSpPr>
+      <p:sp>
+        <p:nvSpPr>
+          <p:cNvPr id="152" name="PYTHON - STATEMENTS"/>
+          <p:cNvSpPr txBox="1"/>
+          <p:nvPr>
+            <p:ph type="title"/>
+          </p:nvPr>
+        </p:nvSpPr>
+        <p:spPr>
+          <a:xfrm>
+            <a:off x="952500" y="406400"/>
+            <a:ext cx="11099800" cy="1370906"/>
+          </a:xfrm>
+          <a:prstGeom prst="rect">
+            <a:avLst/>
+          </a:prstGeom>
+        </p:spPr>
+        <p:txBody>
+          <a:bodyPr/>
+          <a:lstStyle>
+            <a:lvl1pPr>
+              <a:defRPr sz="5600"/>
+            </a:lvl1pPr>
+          </a:lstStyle>
+          <a:p>
+            <a:pPr/>
+            <a:r>
+              <a:t>PYTHON - STATEMENTS</a:t>
+            </a:r>
+          </a:p>
+        </p:txBody>
+      </p:sp>
+      <p:sp>
+        <p:nvSpPr>
+          <p:cNvPr id="153" name="Statements to perform an action to process the data…"/>
+          <p:cNvSpPr txBox="1"/>
+          <p:nvPr>
+            <p:ph type="body" idx="1"/>
+          </p:nvPr>
+        </p:nvSpPr>
+        <p:spPr>
+          <a:xfrm>
+            <a:off x="952500" y="1699468"/>
+            <a:ext cx="11099800" cy="7177832"/>
+          </a:xfrm>
+          <a:prstGeom prst="rect">
+            <a:avLst/>
+          </a:prstGeom>
+        </p:spPr>
+        <p:txBody>
+          <a:bodyPr/>
+          <a:lstStyle/>
+          <a:p>
+            <a:pPr lvl="1" marL="0" indent="0" defTabSz="356362">
+              <a:spcBef>
+                <a:spcPts val="600"/>
+              </a:spcBef>
+              <a:buSzTx/>
+              <a:buNone/>
+              <a:defRPr sz="3660"/>
+            </a:pPr>
+            <a:r>
+              <a:rPr b="1">
+                <a:latin typeface="Helvetica"/>
+                <a:ea typeface="Helvetica"/>
+                <a:cs typeface="Helvetica"/>
+                <a:sym typeface="Helvetica"/>
+              </a:rPr>
+              <a:t>Statements</a:t>
+            </a:r>
+            <a:r>
+              <a:t> to perform an action to process the data</a:t>
+            </a:r>
+          </a:p>
+          <a:p>
+            <a:pPr marL="278892" indent="-278892" defTabSz="356362">
+              <a:spcBef>
+                <a:spcPts val="2500"/>
+              </a:spcBef>
+              <a:defRPr sz="2318"/>
+            </a:pPr>
+            <a:r>
+              <a:t>Statements</a:t>
+            </a:r>
+          </a:p>
+          <a:p>
+            <a:pPr lvl="1" marL="557784" indent="-278892" defTabSz="356362">
+              <a:spcBef>
+                <a:spcPts val="2500"/>
+              </a:spcBef>
+              <a:defRPr sz="2318"/>
+            </a:pPr>
+            <a:r>
+              <a:t>Sequential Statements</a:t>
+            </a:r>
+          </a:p>
+          <a:p>
+            <a:pPr lvl="2" marL="836676" indent="-278892" defTabSz="356362">
+              <a:spcBef>
+                <a:spcPts val="2500"/>
+              </a:spcBef>
+              <a:defRPr sz="2318"/>
+            </a:pPr>
+            <a:r>
+              <a:t>Printing</a:t>
+            </a:r>
+          </a:p>
+          <a:p>
+            <a:pPr lvl="1" marL="557784" indent="-278892" defTabSz="356362">
+              <a:spcBef>
+                <a:spcPts val="2500"/>
+              </a:spcBef>
+              <a:defRPr sz="2318"/>
+            </a:pPr>
+            <a:r>
+              <a:t>Conditional Statements</a:t>
+            </a:r>
+          </a:p>
+          <a:p>
+            <a:pPr lvl="2" marL="836676" indent="-278892" defTabSz="356362">
+              <a:spcBef>
+                <a:spcPts val="2500"/>
+              </a:spcBef>
+              <a:defRPr sz="2318"/>
+            </a:pPr>
+            <a:r>
+              <a:t>if, elif, else</a:t>
+            </a:r>
+          </a:p>
+          <a:p>
+            <a:pPr lvl="2" marL="836676" indent="-278892" defTabSz="356362">
+              <a:spcBef>
+                <a:spcPts val="2500"/>
+              </a:spcBef>
+              <a:defRPr sz="2318"/>
+            </a:pPr>
+            <a:r>
+              <a:t>Loop Commands</a:t>
+            </a:r>
+          </a:p>
+          <a:p>
+            <a:pPr lvl="2" marL="836676" indent="-278892" defTabSz="356362">
+              <a:spcBef>
+                <a:spcPts val="2500"/>
+              </a:spcBef>
+              <a:defRPr sz="2318"/>
+            </a:pPr>
+            <a:r>
+              <a:t>for Loops</a:t>
+            </a:r>
+          </a:p>
+          <a:p>
+            <a:pPr lvl="2" marL="836676" indent="-278892" defTabSz="356362">
+              <a:spcBef>
+                <a:spcPts val="2500"/>
+              </a:spcBef>
+              <a:defRPr sz="2318"/>
+            </a:pPr>
+            <a:r>
+              <a:t>(list comprehension)</a:t>
+            </a:r>
+          </a:p>
+          <a:p>
+            <a:pPr lvl="2" marL="836676" indent="-278892" defTabSz="356362">
+              <a:spcBef>
+                <a:spcPts val="2500"/>
+              </a:spcBef>
+              <a:defRPr sz="2318"/>
+            </a:pPr>
+            <a:r>
+              <a:t>while Loops</a:t>
             </a:r>
           </a:p>
         </p:txBody>

</xml_diff>